<commit_message>
CaaS Xamarin Session 1 Case study update
</commit_message>
<xml_diff>
--- a/Mobile Development/Xamarin/Session 1 - Exploring Mobile Development/Exploring Mobile Development.pptx
+++ b/Mobile Development/Xamarin/Session 1 - Exploring Mobile Development/Exploring Mobile Development.pptx
@@ -8121,7 +8121,7 @@
           <a:p>
             <a:fld id="{49B60EF2-7028-489F-85D8-FE86CD7CF2A0}" type="datetimeFigureOut">
               <a:rPr lang="en-US" smtClean="0"/>
-              <a:t>12/7/2016</a:t>
+              <a:t>1/23/2017</a:t>
             </a:fld>
             <a:endParaRPr lang="en-US"/>
           </a:p>
@@ -11430,35 +11430,39 @@
           <a:p>
             <a:r>
               <a:rPr lang="en-US" dirty="0"/>
-              <a:t>Now let’s talk about a real application which expanded its reach with this approach – </a:t>
+              <a:t>Now let’s talk about a real application which improved to </a:t>
             </a:r>
             <a:r>
               <a:rPr lang="en-US" dirty="0" err="1"/>
-              <a:t>fanband</a:t>
-            </a:r>
-            <a:r>
-              <a:rPr lang="en-US" baseline="0" dirty="0"/>
-              <a:t> by Liquid Daffodil</a:t>
+              <a:t>Xamarin</a:t>
             </a:r>
             <a:r>
               <a:rPr lang="en-US" dirty="0"/>
+              <a:t> – </a:t>
+            </a:r>
+            <a:r>
+              <a:rPr lang="en-US" dirty="0" err="1"/>
+              <a:t>Captio</a:t>
+            </a:r>
+            <a:r>
+              <a:rPr lang="en-US" dirty="0"/>
+              <a:t>, and expense report application.</a:t>
+            </a:r>
+          </a:p>
+          <a:p>
+            <a:r>
+              <a:rPr lang="en-US" b="1" dirty="0"/>
+              <a:t>CLICK – Wrapped web not performant</a:t>
+            </a:r>
+          </a:p>
+          <a:p>
+            <a:r>
+              <a:rPr lang="en-US" b="0" dirty="0"/>
+              <a:t>Their first version of the app worked across Windows, iOS and Android platforms but they were not happy with the performance</a:t>
+            </a:r>
+            <a:r>
+              <a:rPr lang="en-US" b="0" baseline="0" dirty="0"/>
               <a:t>.</a:t>
-            </a:r>
-          </a:p>
-          <a:p>
-            <a:r>
-              <a:rPr lang="en-US" b="1" dirty="0"/>
-              <a:t>CLICK – Top-rated</a:t>
-            </a:r>
-          </a:p>
-          <a:p>
-            <a:r>
-              <a:rPr lang="en-US" b="0" dirty="0" err="1"/>
-              <a:t>Fanband</a:t>
-            </a:r>
-            <a:r>
-              <a:rPr lang="en-US" b="0" baseline="0" dirty="0"/>
-              <a:t> was a top-rated application for Windows Phone.</a:t>
             </a:r>
             <a:endParaRPr lang="en-US" b="0" dirty="0"/>
           </a:p>
@@ -11469,59 +11473,70 @@
             </a:r>
             <a:r>
               <a:rPr lang="en-US" b="1" baseline="0" dirty="0"/>
-              <a:t> – Band</a:t>
+              <a:t> – 3 native apps</a:t>
             </a:r>
           </a:p>
           <a:p>
             <a:r>
               <a:rPr lang="en-US" b="0" baseline="0" dirty="0"/>
-              <a:t>It talked to the Microsoft Band.  The Band was made available to users of Windows, iOS and Android devices, so it made sense that </a:t>
+              <a:t>They then developed 3 different native apps.  This was more performant but then required the maintenance of 3 separate code bases.</a:t>
+            </a:r>
+          </a:p>
+          <a:p>
+            <a:r>
+              <a:rPr lang="en-US" b="1" baseline="0" dirty="0"/>
+              <a:t>CLICK – </a:t>
+            </a:r>
+            <a:r>
+              <a:rPr lang="en-US" b="1" baseline="0" dirty="0" err="1"/>
+              <a:t>Xamarin</a:t>
+            </a:r>
+            <a:r>
+              <a:rPr lang="en-US" b="1" baseline="0" dirty="0"/>
+              <a:t> Native with shared business logic</a:t>
+            </a:r>
+          </a:p>
+          <a:p>
+            <a:r>
+              <a:rPr lang="en-US" b="0" baseline="0" dirty="0"/>
+              <a:t>The made the move to </a:t>
             </a:r>
             <a:r>
               <a:rPr lang="en-US" b="0" baseline="0" dirty="0" err="1"/>
-              <a:t>fanband</a:t>
+              <a:t>Xamarin</a:t>
             </a:r>
             <a:r>
               <a:rPr lang="en-US" b="0" baseline="0" dirty="0"/>
-              <a:t> should be too.</a:t>
+              <a:t> and create shared business logic, reducing the maintenance burden</a:t>
             </a:r>
           </a:p>
           <a:p>
             <a:r>
               <a:rPr lang="en-US" b="1" baseline="0" dirty="0"/>
-              <a:t>CLICK – To iOS &amp; Android</a:t>
+              <a:t>CLICK – </a:t>
+            </a:r>
+            <a:r>
+              <a:rPr lang="en-US" b="1" baseline="0" dirty="0" err="1"/>
+              <a:t>Xamarin.Forms</a:t>
+            </a:r>
+            <a:r>
+              <a:rPr lang="en-US" b="1" baseline="0" dirty="0"/>
+              <a:t> to also get shared UI</a:t>
             </a:r>
           </a:p>
           <a:p>
             <a:r>
               <a:rPr lang="en-US" b="0" baseline="0" dirty="0"/>
-              <a:t>Liquid Daffodil adopted these tools to bring their application to iOS &amp; Android</a:t>
-            </a:r>
-          </a:p>
-          <a:p>
-            <a:r>
-              <a:rPr lang="en-US" b="1" baseline="0" dirty="0"/>
-              <a:t>CLICK – 95%</a:t>
-            </a:r>
-          </a:p>
-          <a:p>
+              <a:t>Finally they moved to </a:t>
+            </a:r>
+            <a:r>
+              <a:rPr lang="en-US" b="0" baseline="0" dirty="0" err="1"/>
+              <a:t>Xamarin</a:t>
+            </a:r>
             <a:r>
               <a:rPr lang="en-US" b="0" baseline="0" dirty="0"/>
-              <a:t>In their case they were able to achieve 95% sharing of code between platforms for business logic and UI code-behind files.</a:t>
-            </a:r>
-          </a:p>
-          <a:p>
-            <a:r>
-              <a:rPr lang="en-US" b="1" baseline="0" dirty="0"/>
-              <a:t>CLICK – UWP</a:t>
-            </a:r>
-          </a:p>
-          <a:p>
-            <a:r>
-              <a:rPr lang="en-US" b="0" baseline="0" dirty="0"/>
-              <a:t>In the process they also easily moved forward to the UWP platform which can enable the app on Windows 10 desktops, tablets, phones and more.</a:t>
-            </a:r>
-            <a:endParaRPr lang="en-US" b="0" dirty="0"/>
+              <a:t> Forms, allowing them to create a shared UI looking almost identical on all platforms.</a:t>
+            </a:r>
           </a:p>
         </p:txBody>
       </p:sp>
@@ -12353,7 +12368,7 @@
           <a:p>
             <a:fld id="{0459C166-16D3-4A25-A2F8-C51E0E346B22}" type="datetimeFigureOut">
               <a:rPr lang="en-US" smtClean="0"/>
-              <a:t>12/7/2016</a:t>
+              <a:t>1/23/2017</a:t>
             </a:fld>
             <a:endParaRPr lang="en-US"/>
           </a:p>
@@ -12448,7 +12463,7 @@
           <a:p>
             <a:fld id="{0459C166-16D3-4A25-A2F8-C51E0E346B22}" type="datetimeFigureOut">
               <a:rPr lang="en-US" smtClean="0"/>
-              <a:t>12/7/2016</a:t>
+              <a:t>1/23/2017</a:t>
             </a:fld>
             <a:endParaRPr lang="en-US"/>
           </a:p>
@@ -12723,7 +12738,7 @@
           <a:p>
             <a:fld id="{0459C166-16D3-4A25-A2F8-C51E0E346B22}" type="datetimeFigureOut">
               <a:rPr lang="en-US" smtClean="0"/>
-              <a:t>12/7/2016</a:t>
+              <a:t>1/23/2017</a:t>
             </a:fld>
             <a:endParaRPr lang="en-US"/>
           </a:p>
@@ -12975,7 +12990,7 @@
           <a:p>
             <a:fld id="{0459C166-16D3-4A25-A2F8-C51E0E346B22}" type="datetimeFigureOut">
               <a:rPr lang="en-US" smtClean="0"/>
-              <a:t>12/7/2016</a:t>
+              <a:t>1/23/2017</a:t>
             </a:fld>
             <a:endParaRPr lang="en-US"/>
           </a:p>
@@ -13143,7 +13158,7 @@
           <a:p>
             <a:fld id="{0459C166-16D3-4A25-A2F8-C51E0E346B22}" type="datetimeFigureOut">
               <a:rPr lang="en-US" smtClean="0"/>
-              <a:t>12/7/2016</a:t>
+              <a:t>1/23/2017</a:t>
             </a:fld>
             <a:endParaRPr lang="en-US"/>
           </a:p>
@@ -13321,7 +13336,7 @@
           <a:p>
             <a:fld id="{0459C166-16D3-4A25-A2F8-C51E0E346B22}" type="datetimeFigureOut">
               <a:rPr lang="en-US" smtClean="0"/>
-              <a:t>12/7/2016</a:t>
+              <a:t>1/23/2017</a:t>
             </a:fld>
             <a:endParaRPr lang="en-US"/>
           </a:p>
@@ -14727,7 +14742,7 @@
           <a:p>
             <a:fld id="{0459C166-16D3-4A25-A2F8-C51E0E346B22}" type="datetimeFigureOut">
               <a:rPr lang="en-US" smtClean="0"/>
-              <a:t>12/7/2016</a:t>
+              <a:t>1/23/2017</a:t>
             </a:fld>
             <a:endParaRPr lang="en-US"/>
           </a:p>
@@ -20717,7 +20732,7 @@
             <a:fld id="{0459C166-16D3-4A25-A2F8-C51E0E346B22}" type="datetimeFigureOut">
               <a:rPr lang="en-US" smtClean="0"/>
               <a:pPr/>
-              <a:t>12/7/2016</a:t>
+              <a:t>1/23/2017</a:t>
             </a:fld>
             <a:endParaRPr lang="en-US"/>
           </a:p>
@@ -24775,7 +24790,7 @@
           <a:p>
             <a:fld id="{0459C166-16D3-4A25-A2F8-C51E0E346B22}" type="datetimeFigureOut">
               <a:rPr lang="en-US" smtClean="0"/>
-              <a:t>12/7/2016</a:t>
+              <a:t>1/23/2017</a:t>
             </a:fld>
             <a:endParaRPr lang="en-US"/>
           </a:p>
@@ -25139,7 +25154,7 @@
           <a:p>
             <a:fld id="{0459C166-16D3-4A25-A2F8-C51E0E346B22}" type="datetimeFigureOut">
               <a:rPr lang="en-US" smtClean="0"/>
-              <a:t>12/7/2016</a:t>
+              <a:t>1/23/2017</a:t>
             </a:fld>
             <a:endParaRPr lang="en-US"/>
           </a:p>
@@ -25256,7 +25271,7 @@
           <a:p>
             <a:fld id="{0459C166-16D3-4A25-A2F8-C51E0E346B22}" type="datetimeFigureOut">
               <a:rPr lang="en-US" smtClean="0"/>
-              <a:t>12/7/2016</a:t>
+              <a:t>1/23/2017</a:t>
             </a:fld>
             <a:endParaRPr lang="en-US"/>
           </a:p>
@@ -25467,7 +25482,7 @@
           <a:p>
             <a:fld id="{0459C166-16D3-4A25-A2F8-C51E0E346B22}" type="datetimeFigureOut">
               <a:rPr lang="en-US" smtClean="0"/>
-              <a:t>12/7/2016</a:t>
+              <a:t>1/23/2017</a:t>
             </a:fld>
             <a:endParaRPr lang="en-US"/>
           </a:p>
@@ -28700,8 +28715,13 @@
           <a:p>
             <a:r>
               <a:rPr lang="en-US" dirty="0"/>
-              <a:t>Platform Access</a:t>
-            </a:r>
+              <a:t>Platform Access with </a:t>
+            </a:r>
+            <a:r>
+              <a:rPr lang="en-US" dirty="0" err="1"/>
+              <a:t>Xamarin</a:t>
+            </a:r>
+            <a:endParaRPr lang="en-US" dirty="0"/>
           </a:p>
         </p:txBody>
       </p:sp>
@@ -49281,11 +49301,11 @@
           <a:p>
             <a:r>
               <a:rPr lang="en-US" dirty="0" err="1"/>
-              <a:t>fanband</a:t>
+              <a:t>Captio</a:t>
             </a:r>
             <a:r>
               <a:rPr lang="en-US" dirty="0"/>
-              <a:t> by Liquid Daffodil</a:t>
+              <a:t> for expense reports</a:t>
             </a:r>
           </a:p>
         </p:txBody>
@@ -49308,58 +49328,57 @@
         </p:spPr>
         <p:txBody>
           <a:bodyPr>
-            <a:normAutofit/>
+            <a:normAutofit fontScale="92500" lnSpcReduction="10000"/>
           </a:bodyPr>
           <a:lstStyle/>
           <a:p>
             <a:r>
               <a:rPr lang="en-US" dirty="0"/>
-              <a:t>A top-rated WP8.1 app</a:t>
+              <a:t>First built with a native wrapped web-based solution but not happy with performance</a:t>
             </a:r>
           </a:p>
           <a:p>
             <a:r>
               <a:rPr lang="en-US" dirty="0"/>
-              <a:t>Works with MS Band</a:t>
+              <a:t>So developed 3 native apps</a:t>
             </a:r>
           </a:p>
           <a:p>
             <a:r>
               <a:rPr lang="en-US" dirty="0"/>
-              <a:t>Brought to:</a:t>
-            </a:r>
-          </a:p>
-          <a:p>
-            <a:pPr lvl="1"/>
+              <a:t>Then to </a:t>
+            </a:r>
+            <a:r>
+              <a:rPr lang="en-US" dirty="0" err="1"/>
+              <a:t>Xamarin</a:t>
+            </a:r>
             <a:r>
               <a:rPr lang="en-US" dirty="0"/>
-              <a:t>iOS</a:t>
-            </a:r>
-          </a:p>
-          <a:p>
-            <a:pPr lvl="1"/>
+              <a:t> Native to share business logic code</a:t>
+            </a:r>
+          </a:p>
+          <a:p>
             <a:r>
               <a:rPr lang="en-US" dirty="0"/>
-              <a:t>Android</a:t>
-            </a:r>
-          </a:p>
-          <a:p>
+              <a:t>Later moved to </a:t>
+            </a:r>
+            <a:r>
+              <a:rPr lang="en-US" dirty="0" err="1"/>
+              <a:t>Xamarin.Forms</a:t>
+            </a:r>
             <a:r>
               <a:rPr lang="en-US" dirty="0"/>
-              <a:t>95% shared code/UI</a:t>
-            </a:r>
-          </a:p>
-          <a:p>
-            <a:r>
-              <a:rPr lang="en-US" dirty="0"/>
-              <a:t>Also easily got UWP</a:t>
-            </a:r>
+              <a:t> to also share UI.</a:t>
+            </a:r>
+          </a:p>
+          <a:p>
+            <a:endParaRPr lang="en-US" dirty="0"/>
           </a:p>
         </p:txBody>
       </p:sp>
       <p:pic>
         <p:nvPicPr>
-          <p:cNvPr id="5" name="Content Placeholder 4"/>
+          <p:cNvPr id="7" name="Content Placeholder 6"/>
           <p:cNvPicPr>
             <a:picLocks noGrp="1" noChangeAspect="1"/>
           </p:cNvPicPr>
@@ -49368,22 +49387,19 @@
           </p:nvPr>
         </p:nvPicPr>
         <p:blipFill>
-          <a:blip r:embed="rId3">
-            <a:extLst>
-              <a:ext uri="{28A0092B-C50C-407E-A947-70E740481C1C}">
-                <a14:useLocalDpi xmlns:a14="http://schemas.microsoft.com/office/drawing/2010/main" val="0"/>
-              </a:ext>
-            </a:extLst>
-          </a:blip>
+          <a:blip r:embed="rId3"/>
           <a:stretch>
             <a:fillRect/>
           </a:stretch>
         </p:blipFill>
         <p:spPr>
           <a:xfrm>
-            <a:off x="5067300" y="1908617"/>
-            <a:ext cx="6617728" cy="3895793"/>
+            <a:off x="5217549" y="2159214"/>
+            <a:ext cx="7090902" cy="3684160"/>
           </a:xfrm>
+          <a:prstGeom prst="rect">
+            <a:avLst/>
+          </a:prstGeom>
         </p:spPr>
       </p:pic>
     </p:spTree>
@@ -49545,39 +49561,26 @@
                                   </p:childTnLst>
                                 </p:cTn>
                               </p:par>
+                            </p:childTnLst>
+                          </p:cTn>
+                        </p:par>
+                      </p:childTnLst>
+                    </p:cTn>
+                  </p:par>
+                  <p:par>
+                    <p:cTn id="15" fill="hold">
+                      <p:stCondLst>
+                        <p:cond delay="indefinite"/>
+                      </p:stCondLst>
+                      <p:childTnLst>
+                        <p:par>
+                          <p:cTn id="16" fill="hold">
+                            <p:stCondLst>
+                              <p:cond delay="0"/>
+                            </p:stCondLst>
+                            <p:childTnLst>
                               <p:par>
-                                <p:cTn id="15" presetID="1" presetClass="entr" presetSubtype="0" fill="hold" grpId="0" nodeType="withEffect">
-                                  <p:stCondLst>
-                                    <p:cond delay="0"/>
-                                  </p:stCondLst>
-                                  <p:childTnLst>
-                                    <p:set>
-                                      <p:cBhvr>
-                                        <p:cTn id="16" dur="1" fill="hold">
-                                          <p:stCondLst>
-                                            <p:cond delay="0"/>
-                                          </p:stCondLst>
-                                        </p:cTn>
-                                        <p:tgtEl>
-                                          <p:spTgt spid="3">
-                                            <p:txEl>
-                                              <p:pRg st="3" end="3"/>
-                                            </p:txEl>
-                                          </p:spTgt>
-                                        </p:tgtEl>
-                                        <p:attrNameLst>
-                                          <p:attrName>style.visibility</p:attrName>
-                                        </p:attrNameLst>
-                                      </p:cBhvr>
-                                      <p:to>
-                                        <p:strVal val="visible"/>
-                                      </p:to>
-                                    </p:set>
-                                  </p:childTnLst>
-                                </p:cTn>
-                              </p:par>
-                              <p:par>
-                                <p:cTn id="17" presetID="1" presetClass="entr" presetSubtype="0" fill="hold" grpId="0" nodeType="withEffect">
+                                <p:cTn id="17" presetID="1" presetClass="entr" presetSubtype="0" fill="hold" grpId="0" nodeType="clickEffect">
                                   <p:stCondLst>
                                     <p:cond delay="0"/>
                                   </p:stCondLst>
@@ -49592,105 +49595,7 @@
                                         <p:tgtEl>
                                           <p:spTgt spid="3">
                                             <p:txEl>
-                                              <p:pRg st="4" end="4"/>
-                                            </p:txEl>
-                                          </p:spTgt>
-                                        </p:tgtEl>
-                                        <p:attrNameLst>
-                                          <p:attrName>style.visibility</p:attrName>
-                                        </p:attrNameLst>
-                                      </p:cBhvr>
-                                      <p:to>
-                                        <p:strVal val="visible"/>
-                                      </p:to>
-                                    </p:set>
-                                  </p:childTnLst>
-                                </p:cTn>
-                              </p:par>
-                            </p:childTnLst>
-                          </p:cTn>
-                        </p:par>
-                      </p:childTnLst>
-                    </p:cTn>
-                  </p:par>
-                  <p:par>
-                    <p:cTn id="19" fill="hold">
-                      <p:stCondLst>
-                        <p:cond delay="indefinite"/>
-                      </p:stCondLst>
-                      <p:childTnLst>
-                        <p:par>
-                          <p:cTn id="20" fill="hold">
-                            <p:stCondLst>
-                              <p:cond delay="0"/>
-                            </p:stCondLst>
-                            <p:childTnLst>
-                              <p:par>
-                                <p:cTn id="21" presetID="1" presetClass="entr" presetSubtype="0" fill="hold" grpId="0" nodeType="clickEffect">
-                                  <p:stCondLst>
-                                    <p:cond delay="0"/>
-                                  </p:stCondLst>
-                                  <p:childTnLst>
-                                    <p:set>
-                                      <p:cBhvr>
-                                        <p:cTn id="22" dur="1" fill="hold">
-                                          <p:stCondLst>
-                                            <p:cond delay="0"/>
-                                          </p:stCondLst>
-                                        </p:cTn>
-                                        <p:tgtEl>
-                                          <p:spTgt spid="3">
-                                            <p:txEl>
-                                              <p:pRg st="5" end="5"/>
-                                            </p:txEl>
-                                          </p:spTgt>
-                                        </p:tgtEl>
-                                        <p:attrNameLst>
-                                          <p:attrName>style.visibility</p:attrName>
-                                        </p:attrNameLst>
-                                      </p:cBhvr>
-                                      <p:to>
-                                        <p:strVal val="visible"/>
-                                      </p:to>
-                                    </p:set>
-                                  </p:childTnLst>
-                                </p:cTn>
-                              </p:par>
-                            </p:childTnLst>
-                          </p:cTn>
-                        </p:par>
-                      </p:childTnLst>
-                    </p:cTn>
-                  </p:par>
-                  <p:par>
-                    <p:cTn id="23" fill="hold">
-                      <p:stCondLst>
-                        <p:cond delay="indefinite"/>
-                      </p:stCondLst>
-                      <p:childTnLst>
-                        <p:par>
-                          <p:cTn id="24" fill="hold">
-                            <p:stCondLst>
-                              <p:cond delay="0"/>
-                            </p:stCondLst>
-                            <p:childTnLst>
-                              <p:par>
-                                <p:cTn id="25" presetID="1" presetClass="entr" presetSubtype="0" fill="hold" grpId="0" nodeType="clickEffect">
-                                  <p:stCondLst>
-                                    <p:cond delay="0"/>
-                                  </p:stCondLst>
-                                  <p:childTnLst>
-                                    <p:set>
-                                      <p:cBhvr>
-                                        <p:cTn id="26" dur="1" fill="hold">
-                                          <p:stCondLst>
-                                            <p:cond delay="0"/>
-                                          </p:stCondLst>
-                                        </p:cTn>
-                                        <p:tgtEl>
-                                          <p:spTgt spid="3">
-                                            <p:txEl>
-                                              <p:pRg st="6" end="6"/>
+                                              <p:pRg st="3" end="3"/>
                                             </p:txEl>
                                           </p:spTgt>
                                         </p:tgtEl>
@@ -52668,7 +52573,7 @@
             </a:extLst>
           </p:spPr>
           <p:txBody>
-            <a:bodyPr vert="horz" wrap="none" lIns="0" tIns="0" rIns="0" bIns="0" numCol="1" anchor="ctr" anchorCtr="0" compatLnSpc="1">
+            <a:bodyPr vert="horz" wrap="square" lIns="0" tIns="0" rIns="0" bIns="0" numCol="1" anchor="ctr" anchorCtr="0" compatLnSpc="1">
               <a:prstTxWarp prst="textNoShape">
                 <a:avLst/>
               </a:prstTxWarp>
@@ -53738,7 +53643,7 @@
         </p:nvGrpSpPr>
         <p:grpSpPr>
           <a:xfrm>
-            <a:off x="1482716" y="5064898"/>
+            <a:off x="1632979" y="5339207"/>
             <a:ext cx="2832710" cy="369332"/>
             <a:chOff x="4239577" y="2384168"/>
             <a:chExt cx="2832710" cy="369332"/>
@@ -53798,6 +53703,35 @@
           </p:txBody>
         </p:sp>
       </p:grpSp>
+      <p:pic>
+        <p:nvPicPr>
+          <p:cNvPr id="4" name="Picture 3"/>
+          <p:cNvPicPr>
+            <a:picLocks noChangeAspect="1"/>
+          </p:cNvPicPr>
+          <p:nvPr/>
+        </p:nvPicPr>
+        <p:blipFill rotWithShape="1">
+          <a:blip r:embed="rId5">
+            <a:extLst>
+              <a:ext uri="{28A0092B-C50C-407E-A947-70E740481C1C}">
+                <a14:useLocalDpi xmlns:a14="http://schemas.microsoft.com/office/drawing/2010/main" val="0"/>
+              </a:ext>
+            </a:extLst>
+          </a:blip>
+          <a:srcRect t="28842" b="22763"/>
+          <a:stretch/>
+        </p:blipFill>
+        <p:spPr>
+          <a:xfrm>
+            <a:off x="2231326" y="4633248"/>
+            <a:ext cx="1262157" cy="431650"/>
+          </a:xfrm>
+          <a:prstGeom prst="rect">
+            <a:avLst/>
+          </a:prstGeom>
+        </p:spPr>
+      </p:pic>
     </p:spTree>
     <p:extLst>
       <p:ext uri="{BB962C8B-B14F-4D97-AF65-F5344CB8AC3E}">
@@ -53863,6 +53797,41 @@
                                   </p:childTnLst>
                                 </p:cTn>
                               </p:par>
+                              <p:par>
+                                <p:cTn id="8" presetID="10" presetClass="entr" presetSubtype="0" fill="hold" nodeType="withEffect">
+                                  <p:stCondLst>
+                                    <p:cond delay="0"/>
+                                  </p:stCondLst>
+                                  <p:childTnLst>
+                                    <p:set>
+                                      <p:cBhvr>
+                                        <p:cTn id="9" dur="1" fill="hold">
+                                          <p:stCondLst>
+                                            <p:cond delay="0"/>
+                                          </p:stCondLst>
+                                        </p:cTn>
+                                        <p:tgtEl>
+                                          <p:spTgt spid="4"/>
+                                        </p:tgtEl>
+                                        <p:attrNameLst>
+                                          <p:attrName>style.visibility</p:attrName>
+                                        </p:attrNameLst>
+                                      </p:cBhvr>
+                                      <p:to>
+                                        <p:strVal val="visible"/>
+                                      </p:to>
+                                    </p:set>
+                                    <p:animEffect transition="in" filter="fade">
+                                      <p:cBhvr>
+                                        <p:cTn id="10" dur="500"/>
+                                        <p:tgtEl>
+                                          <p:spTgt spid="4"/>
+                                        </p:tgtEl>
+                                      </p:cBhvr>
+                                    </p:animEffect>
+                                  </p:childTnLst>
+                                </p:cTn>
+                              </p:par>
                             </p:childTnLst>
                           </p:cTn>
                         </p:par>
@@ -53870,26 +53839,26 @@
                     </p:cTn>
                   </p:par>
                   <p:par>
-                    <p:cTn id="8" fill="hold">
+                    <p:cTn id="11" fill="hold">
                       <p:stCondLst>
                         <p:cond delay="indefinite"/>
                       </p:stCondLst>
                       <p:childTnLst>
                         <p:par>
-                          <p:cTn id="9" fill="hold">
+                          <p:cTn id="12" fill="hold">
                             <p:stCondLst>
                               <p:cond delay="0"/>
                             </p:stCondLst>
                             <p:childTnLst>
                               <p:par>
-                                <p:cTn id="10" presetID="10" presetClass="entr" presetSubtype="0" fill="hold" nodeType="clickEffect">
+                                <p:cTn id="13" presetID="10" presetClass="entr" presetSubtype="0" fill="hold" nodeType="clickEffect">
                                   <p:stCondLst>
                                     <p:cond delay="0"/>
                                   </p:stCondLst>
                                   <p:childTnLst>
                                     <p:set>
                                       <p:cBhvr>
-                                        <p:cTn id="11" dur="1" fill="hold">
+                                        <p:cTn id="14" dur="1" fill="hold">
                                           <p:stCondLst>
                                             <p:cond delay="0"/>
                                           </p:stCondLst>
@@ -53907,7 +53876,7 @@
                                     </p:set>
                                     <p:animEffect transition="in" filter="fade">
                                       <p:cBhvr>
-                                        <p:cTn id="12" dur="500"/>
+                                        <p:cTn id="15" dur="500"/>
                                         <p:tgtEl>
                                           <p:spTgt spid="16"/>
                                         </p:tgtEl>
@@ -53923,26 +53892,26 @@
                     </p:cTn>
                   </p:par>
                   <p:par>
-                    <p:cTn id="13" fill="hold">
+                    <p:cTn id="16" fill="hold">
                       <p:stCondLst>
                         <p:cond delay="indefinite"/>
                       </p:stCondLst>
                       <p:childTnLst>
                         <p:par>
-                          <p:cTn id="14" fill="hold">
+                          <p:cTn id="17" fill="hold">
                             <p:stCondLst>
                               <p:cond delay="0"/>
                             </p:stCondLst>
                             <p:childTnLst>
                               <p:par>
-                                <p:cTn id="15" presetID="10" presetClass="entr" presetSubtype="0" fill="hold" nodeType="clickEffect">
+                                <p:cTn id="18" presetID="10" presetClass="entr" presetSubtype="0" fill="hold" nodeType="clickEffect">
                                   <p:stCondLst>
                                     <p:cond delay="0"/>
                                   </p:stCondLst>
                                   <p:childTnLst>
                                     <p:set>
                                       <p:cBhvr>
-                                        <p:cTn id="16" dur="1" fill="hold">
+                                        <p:cTn id="19" dur="1" fill="hold">
                                           <p:stCondLst>
                                             <p:cond delay="0"/>
                                           </p:stCondLst>
@@ -53960,7 +53929,7 @@
                                     </p:set>
                                     <p:animEffect transition="in" filter="fade">
                                       <p:cBhvr>
-                                        <p:cTn id="17" dur="500"/>
+                                        <p:cTn id="20" dur="500"/>
                                         <p:tgtEl>
                                           <p:spTgt spid="15"/>
                                         </p:tgtEl>
@@ -53976,26 +53945,26 @@
                     </p:cTn>
                   </p:par>
                   <p:par>
-                    <p:cTn id="18" fill="hold">
+                    <p:cTn id="21" fill="hold">
                       <p:stCondLst>
                         <p:cond delay="indefinite"/>
                       </p:stCondLst>
                       <p:childTnLst>
                         <p:par>
-                          <p:cTn id="19" fill="hold">
+                          <p:cTn id="22" fill="hold">
                             <p:stCondLst>
                               <p:cond delay="0"/>
                             </p:stCondLst>
                             <p:childTnLst>
                               <p:par>
-                                <p:cTn id="20" presetID="10" presetClass="entr" presetSubtype="0" fill="hold" grpId="0" nodeType="clickEffect">
+                                <p:cTn id="23" presetID="10" presetClass="entr" presetSubtype="0" fill="hold" grpId="0" nodeType="clickEffect">
                                   <p:stCondLst>
                                     <p:cond delay="0"/>
                                   </p:stCondLst>
                                   <p:childTnLst>
                                     <p:set>
                                       <p:cBhvr>
-                                        <p:cTn id="21" dur="1" fill="hold">
+                                        <p:cTn id="24" dur="1" fill="hold">
                                           <p:stCondLst>
                                             <p:cond delay="0"/>
                                           </p:stCondLst>
@@ -54013,7 +53982,7 @@
                                     </p:set>
                                     <p:animEffect transition="in" filter="fade">
                                       <p:cBhvr>
-                                        <p:cTn id="22" dur="500"/>
+                                        <p:cTn id="25" dur="500"/>
                                         <p:tgtEl>
                                           <p:spTgt spid="3"/>
                                         </p:tgtEl>

</xml_diff>